<commit_message>
update presentation - add link to blog
</commit_message>
<xml_diff>
--- a/Presentation_Team_Shruikan.pptx
+++ b/Presentation_Team_Shruikan.pptx
@@ -248,7 +248,7 @@
           <a:p>
             <a:fld id="{F3788DD0-047F-4359-BFD4-ABF72BC37572}" type="datetimeFigureOut">
               <a:rPr lang="bg-BG" smtClean="0"/>
-              <a:t>20.4.2016 г.</a:t>
+              <a:t>21.4.2016 г.</a:t>
             </a:fld>
             <a:endParaRPr lang="bg-BG"/>
           </a:p>
@@ -418,7 +418,7 @@
           <a:p>
             <a:fld id="{F3788DD0-047F-4359-BFD4-ABF72BC37572}" type="datetimeFigureOut">
               <a:rPr lang="bg-BG" smtClean="0"/>
-              <a:t>20.4.2016 г.</a:t>
+              <a:t>21.4.2016 г.</a:t>
             </a:fld>
             <a:endParaRPr lang="bg-BG"/>
           </a:p>
@@ -598,7 +598,7 @@
           <a:p>
             <a:fld id="{F3788DD0-047F-4359-BFD4-ABF72BC37572}" type="datetimeFigureOut">
               <a:rPr lang="bg-BG" smtClean="0"/>
-              <a:t>20.4.2016 г.</a:t>
+              <a:t>21.4.2016 г.</a:t>
             </a:fld>
             <a:endParaRPr lang="bg-BG"/>
           </a:p>
@@ -768,7 +768,7 @@
           <a:p>
             <a:fld id="{F3788DD0-047F-4359-BFD4-ABF72BC37572}" type="datetimeFigureOut">
               <a:rPr lang="bg-BG" smtClean="0"/>
-              <a:t>20.4.2016 г.</a:t>
+              <a:t>21.4.2016 г.</a:t>
             </a:fld>
             <a:endParaRPr lang="bg-BG"/>
           </a:p>
@@ -1014,7 +1014,7 @@
           <a:p>
             <a:fld id="{F3788DD0-047F-4359-BFD4-ABF72BC37572}" type="datetimeFigureOut">
               <a:rPr lang="bg-BG" smtClean="0"/>
-              <a:t>20.4.2016 г.</a:t>
+              <a:t>21.4.2016 г.</a:t>
             </a:fld>
             <a:endParaRPr lang="bg-BG"/>
           </a:p>
@@ -1246,7 +1246,7 @@
           <a:p>
             <a:fld id="{F3788DD0-047F-4359-BFD4-ABF72BC37572}" type="datetimeFigureOut">
               <a:rPr lang="bg-BG" smtClean="0"/>
-              <a:t>20.4.2016 г.</a:t>
+              <a:t>21.4.2016 г.</a:t>
             </a:fld>
             <a:endParaRPr lang="bg-BG"/>
           </a:p>
@@ -1613,7 +1613,7 @@
           <a:p>
             <a:fld id="{F3788DD0-047F-4359-BFD4-ABF72BC37572}" type="datetimeFigureOut">
               <a:rPr lang="bg-BG" smtClean="0"/>
-              <a:t>20.4.2016 г.</a:t>
+              <a:t>21.4.2016 г.</a:t>
             </a:fld>
             <a:endParaRPr lang="bg-BG"/>
           </a:p>
@@ -1731,7 +1731,7 @@
           <a:p>
             <a:fld id="{F3788DD0-047F-4359-BFD4-ABF72BC37572}" type="datetimeFigureOut">
               <a:rPr lang="bg-BG" smtClean="0"/>
-              <a:t>20.4.2016 г.</a:t>
+              <a:t>21.4.2016 г.</a:t>
             </a:fld>
             <a:endParaRPr lang="bg-BG"/>
           </a:p>
@@ -1826,7 +1826,7 @@
           <a:p>
             <a:fld id="{F3788DD0-047F-4359-BFD4-ABF72BC37572}" type="datetimeFigureOut">
               <a:rPr lang="bg-BG" smtClean="0"/>
-              <a:t>20.4.2016 г.</a:t>
+              <a:t>21.4.2016 г.</a:t>
             </a:fld>
             <a:endParaRPr lang="bg-BG"/>
           </a:p>
@@ -2103,7 +2103,7 @@
           <a:p>
             <a:fld id="{F3788DD0-047F-4359-BFD4-ABF72BC37572}" type="datetimeFigureOut">
               <a:rPr lang="bg-BG" smtClean="0"/>
-              <a:t>20.4.2016 г.</a:t>
+              <a:t>21.4.2016 г.</a:t>
             </a:fld>
             <a:endParaRPr lang="bg-BG"/>
           </a:p>
@@ -2356,7 +2356,7 @@
           <a:p>
             <a:fld id="{F3788DD0-047F-4359-BFD4-ABF72BC37572}" type="datetimeFigureOut">
               <a:rPr lang="bg-BG" smtClean="0"/>
-              <a:t>20.4.2016 г.</a:t>
+              <a:t>21.4.2016 г.</a:t>
             </a:fld>
             <a:endParaRPr lang="bg-BG"/>
           </a:p>
@@ -2569,7 +2569,7 @@
           <a:p>
             <a:fld id="{F3788DD0-047F-4359-BFD4-ABF72BC37572}" type="datetimeFigureOut">
               <a:rPr lang="bg-BG" smtClean="0"/>
-              <a:t>20.4.2016 г.</a:t>
+              <a:t>21.4.2016 г.</a:t>
             </a:fld>
             <a:endParaRPr lang="bg-BG"/>
           </a:p>
@@ -3223,7 +3223,7 @@
                   </a:schemeClr>
                 </a:solidFill>
               </a:rPr>
-              <a:t>Java Fundamential Team “</a:t>
+              <a:t>Java Fundamentals Team “</a:t>
             </a:r>
             <a:r>
               <a:rPr lang="en-US" sz="5400" dirty="0" smtClean="0">
@@ -3267,7 +3267,7 @@
         </p:nvSpPr>
         <p:spPr>
           <a:xfrm>
-            <a:off x="1595719" y="1795044"/>
+            <a:off x="1676400" y="1777115"/>
             <a:ext cx="5620870" cy="4216539"/>
           </a:xfrm>
           <a:prstGeom prst="rect">
@@ -3535,8 +3535,8 @@
               <a:rPr lang="bg-BG" sz="2800" dirty="0" smtClean="0">
                 <a:solidFill>
                   <a:schemeClr val="accent6">
-                    <a:lumMod val="20000"/>
-                    <a:lumOff val="80000"/>
+                    <a:lumMod val="40000"/>
+                    <a:lumOff val="60000"/>
                   </a:schemeClr>
                 </a:solidFill>
               </a:rPr>
@@ -3545,8 +3545,8 @@
             <a:endParaRPr lang="bg-BG" sz="2800" dirty="0">
               <a:solidFill>
                 <a:schemeClr val="accent6">
-                  <a:lumMod val="20000"/>
-                  <a:lumOff val="80000"/>
+                  <a:lumMod val="40000"/>
+                  <a:lumOff val="60000"/>
                 </a:schemeClr>
               </a:solidFill>
             </a:endParaRPr>
@@ -4864,9 +4864,7 @@
       </p:sp>
       <p:pic>
         <p:nvPicPr>
-          <p:cNvPr id="4" name="Picture 2" descr="C:\Users\Asrock\Documents\My Documents 1\JAVA_SoftUni\Projects\Marina_Projects\Marina_Java_Game\Images\Shruikan_skin_files\latest(3)">
-            <a:hlinkClick r:id="rId2"/>
-          </p:cNvPr>
+          <p:cNvPr id="4" name="Picture 2" descr="C:\Users\Asrock\Documents\My Documents 1\JAVA_SoftUni\Projects\Marina_Projects\Marina_Java_Game\Images\Shruikan_skin_files\latest(3)"/>
           <p:cNvPicPr>
             <a:picLocks noGrp="1" noChangeAspect="1" noChangeArrowheads="1"/>
           </p:cNvPicPr>
@@ -4875,7 +4873,7 @@
           </p:nvPr>
         </p:nvPicPr>
         <p:blipFill>
-          <a:blip r:embed="rId3">
+          <a:blip r:embed="rId2">
             <a:extLst>
               <a:ext uri="{28A0092B-C50C-407E-A947-70E740481C1C}">
                 <a14:useLocalDpi xmlns:a14="http://schemas.microsoft.com/office/drawing/2010/main" val="0"/>
@@ -4915,8 +4913,8 @@
         </p:nvSpPr>
         <p:spPr>
           <a:xfrm>
-            <a:off x="3442444" y="1332538"/>
-            <a:ext cx="4168589" cy="1446550"/>
+            <a:off x="3603804" y="737156"/>
+            <a:ext cx="4168589" cy="1015663"/>
           </a:xfrm>
           <a:prstGeom prst="rect">
             <a:avLst/>
@@ -4984,8 +4982,6 @@
               </a:rPr>
               <a:t>:</a:t>
             </a:r>
-          </a:p>
-          <a:p>
             <a:endParaRPr lang="en-US" sz="2800" dirty="0">
               <a:solidFill>
                 <a:schemeClr val="accent6">
@@ -5020,16 +5016,14 @@
       </p:sp>
       <p:sp>
         <p:nvSpPr>
-          <p:cNvPr id="6" name="TextBox 5">
-            <a:hlinkClick r:id="rId2"/>
-          </p:cNvPr>
+          <p:cNvPr id="6" name="TextBox 5"/>
           <p:cNvSpPr txBox="1"/>
           <p:nvPr/>
         </p:nvSpPr>
         <p:spPr>
           <a:xfrm>
-            <a:off x="838200" y="4168093"/>
-            <a:ext cx="9897035" cy="1200329"/>
+            <a:off x="739582" y="4521300"/>
+            <a:ext cx="9897035" cy="1754326"/>
           </a:xfrm>
           <a:prstGeom prst="rect">
             <a:avLst/>
@@ -5051,34 +5045,141 @@
                   </a:schemeClr>
                 </a:solidFill>
               </a:rPr>
-              <a:t>                          GitHub Repository Link</a:t>
-            </a:r>
-            <a:r>
-              <a:rPr lang="en-US" sz="3600" dirty="0" smtClean="0">
-                <a:solidFill>
-                  <a:schemeClr val="accent6">
-                    <a:lumMod val="20000"/>
-                    <a:lumOff val="80000"/>
-                  </a:schemeClr>
-                </a:solidFill>
-              </a:rPr>
-              <a:t>:</a:t>
-            </a:r>
-          </a:p>
+              <a:t>                          GitHub Repository Link:</a:t>
+            </a:r>
+          </a:p>
+          <a:p>
+            <a:r>
+              <a:rPr lang="bg-BG" sz="3600" u="sng" dirty="0" smtClean="0">
+                <a:hlinkClick r:id="rId3"/>
+              </a:rPr>
+              <a:t>https</a:t>
+            </a:r>
+            <a:r>
+              <a:rPr lang="bg-BG" sz="3600" u="sng" dirty="0">
+                <a:hlinkClick r:id="rId3"/>
+              </a:rPr>
+              <a:t>://github.com/MightyHasu/ShruikanHangMan</a:t>
+            </a:r>
+            <a:endParaRPr lang="bg-BG" sz="3600" dirty="0"/>
+          </a:p>
+          <a:p>
+            <a:endParaRPr lang="bg-BG" sz="3600" dirty="0">
+              <a:solidFill>
+                <a:schemeClr val="accent6">
+                  <a:lumMod val="20000"/>
+                  <a:lumOff val="80000"/>
+                </a:schemeClr>
+              </a:solidFill>
+            </a:endParaRPr>
+          </a:p>
+        </p:txBody>
+      </p:sp>
+      <p:sp>
+        <p:nvSpPr>
+          <p:cNvPr id="3" name="TextBox 2"/>
+          <p:cNvSpPr txBox="1"/>
+          <p:nvPr/>
+        </p:nvSpPr>
+        <p:spPr>
+          <a:xfrm>
+            <a:off x="2483218" y="2572654"/>
+            <a:ext cx="6409765" cy="1384995"/>
+          </a:xfrm>
+          <a:prstGeom prst="rect">
+            <a:avLst/>
+          </a:prstGeom>
+          <a:noFill/>
+        </p:spPr>
+        <p:txBody>
+          <a:bodyPr wrap="square" rtlCol="0">
+            <a:spAutoFit/>
+          </a:bodyPr>
+          <a:lstStyle/>
           <a:p>
             <a:pPr algn="ctr"/>
             <a:r>
-              <a:rPr lang="en-US" sz="3600" dirty="0">
-                <a:solidFill>
-                  <a:schemeClr val="accent6">
-                    <a:lumMod val="20000"/>
-                    <a:lumOff val="80000"/>
-                  </a:schemeClr>
-                </a:solidFill>
-              </a:rPr>
-              <a:t>https://github.com/MightyHasu/Mighty-Shruikan</a:t>
-            </a:r>
-            <a:endParaRPr lang="en-US" sz="3600" dirty="0" smtClean="0">
+              <a:rPr lang="en-US" sz="2800" dirty="0">
+                <a:solidFill>
+                  <a:schemeClr val="accent6">
+                    <a:lumMod val="20000"/>
+                    <a:lumOff val="80000"/>
+                  </a:schemeClr>
+                </a:solidFill>
+              </a:rPr>
+              <a:t>You can see explanations in</a:t>
+            </a:r>
+            <a:r>
+              <a:rPr lang="bg-BG" sz="2800" dirty="0">
+                <a:solidFill>
+                  <a:schemeClr val="accent6">
+                    <a:lumMod val="20000"/>
+                    <a:lumOff val="80000"/>
+                  </a:schemeClr>
+                </a:solidFill>
+              </a:rPr>
+              <a:t> </a:t>
+            </a:r>
+            <a:r>
+              <a:rPr lang="en-US" sz="2800" dirty="0">
+                <a:solidFill>
+                  <a:schemeClr val="accent6">
+                    <a:lumMod val="20000"/>
+                    <a:lumOff val="80000"/>
+                  </a:schemeClr>
+                </a:solidFill>
+              </a:rPr>
+              <a:t>Bulgarian at:</a:t>
+            </a:r>
+            <a:br>
+              <a:rPr lang="en-US" sz="2800" dirty="0">
+                <a:solidFill>
+                  <a:schemeClr val="accent6">
+                    <a:lumMod val="20000"/>
+                    <a:lumOff val="80000"/>
+                  </a:schemeClr>
+                </a:solidFill>
+              </a:rPr>
+            </a:br>
+            <a:r>
+              <a:rPr lang="en-US" sz="2800" dirty="0">
+                <a:hlinkClick r:id="rId4"/>
+              </a:rPr>
+              <a:t>https://</a:t>
+            </a:r>
+            <a:r>
+              <a:rPr lang="en-US" sz="2800" dirty="0" smtClean="0">
+                <a:hlinkClick r:id="rId4"/>
+              </a:rPr>
+              <a:t>mariva66blog.wordpress.com</a:t>
+            </a:r>
+            <a:endParaRPr lang="bg-BG" sz="2800" dirty="0" smtClean="0"/>
+          </a:p>
+          <a:p>
+            <a:pPr algn="ctr"/>
+            <a:r>
+              <a:rPr lang="en-US" sz="2800" dirty="0" smtClean="0">
+                <a:solidFill>
+                  <a:schemeClr val="accent6">
+                    <a:lumMod val="20000"/>
+                    <a:lumOff val="80000"/>
+                  </a:schemeClr>
+                </a:solidFill>
+              </a:rPr>
+              <a:t>We </a:t>
+            </a:r>
+            <a:r>
+              <a:rPr lang="en-US" sz="2800" dirty="0">
+                <a:solidFill>
+                  <a:schemeClr val="accent6">
+                    <a:lumMod val="20000"/>
+                    <a:lumOff val="80000"/>
+                  </a:schemeClr>
+                </a:solidFill>
+              </a:rPr>
+              <a:t>are open for feedback and comments</a:t>
+            </a:r>
+            <a:endParaRPr lang="bg-BG" sz="2800" dirty="0">
               <a:solidFill>
                 <a:schemeClr val="accent6">
                   <a:lumMod val="20000"/>
@@ -5187,8 +5288,8 @@
         </p:blipFill>
         <p:spPr bwMode="auto">
           <a:xfrm>
-            <a:off x="-18527" y="71717"/>
-            <a:ext cx="12192000" cy="7922820"/>
+            <a:off x="-18527" y="0"/>
+            <a:ext cx="12228456" cy="7922820"/>
           </a:xfrm>
           <a:prstGeom prst="rect">
             <a:avLst/>
@@ -5318,7 +5419,7 @@
               <a:t>                    </a:t>
             </a:r>
             <a:r>
-              <a:rPr lang="en-US" sz="3200" dirty="0" err="1" smtClean="0">
+              <a:rPr lang="en-US" sz="3200" dirty="0" smtClean="0">
                 <a:solidFill>
                   <a:schemeClr val="accent6">
                     <a:lumMod val="40000"/>
@@ -5328,14 +5429,6 @@
               </a:rPr>
               <a:t>SoftUni</a:t>
             </a:r>
-            <a:endParaRPr lang="en-US" sz="3200" dirty="0" smtClean="0">
-              <a:solidFill>
-                <a:schemeClr val="accent6">
-                  <a:lumMod val="40000"/>
-                  <a:lumOff val="60000"/>
-                </a:schemeClr>
-              </a:solidFill>
-            </a:endParaRPr>
           </a:p>
           <a:p>
             <a:r>
@@ -5365,7 +5458,7 @@
                   </a:outerShdw>
                 </a:effectLst>
               </a:rPr>
-              <a:t>Java Fundamential </a:t>
+              <a:t>Java Fundamentals </a:t>
             </a:r>
             <a:r>
               <a:rPr lang="en-US" sz="3200" dirty="0" smtClean="0">

</xml_diff>